<commit_message>
Update Binary Encoding presentation file
</commit_message>
<xml_diff>
--- a/My Note and Practice/Text to Numerical Data Conversion/Categorical(Text to Numeric) data conversion-CTtN/Nominal Data/CTNtN2. Binary Encoding/Binary Encoding.pptx
+++ b/My Note and Practice/Text to Numerical Data Conversion/Categorical(Text to Numeric) data conversion-CTtN/Nominal Data/CTNtN2. Binary Encoding/Binary Encoding.pptx
@@ -10,7 +10,6 @@
     <p:sldId id="321" r:id="rId4"/>
     <p:sldId id="311" r:id="rId5"/>
     <p:sldId id="320" r:id="rId6"/>
-    <p:sldId id="322" r:id="rId7"/>
   </p:sldIdLst>
   <p:sldSz cx="12192000" cy="6858000"/>
   <p:notesSz cx="6858000" cy="9144000"/>
@@ -264,7 +263,7 @@
           <a:p>
             <a:fld id="{BC408777-D8E4-48B9-88F2-93B50ADA839C}" type="datetimeFigureOut">
               <a:rPr lang="en-US" smtClean="0"/>
-              <a:t>11/8/2025</a:t>
+              <a:t>11/17/2025</a:t>
             </a:fld>
             <a:endParaRPr lang="en-US"/>
           </a:p>
@@ -462,7 +461,7 @@
           <a:p>
             <a:fld id="{BC408777-D8E4-48B9-88F2-93B50ADA839C}" type="datetimeFigureOut">
               <a:rPr lang="en-US" smtClean="0"/>
-              <a:t>11/8/2025</a:t>
+              <a:t>11/17/2025</a:t>
             </a:fld>
             <a:endParaRPr lang="en-US"/>
           </a:p>
@@ -670,7 +669,7 @@
           <a:p>
             <a:fld id="{BC408777-D8E4-48B9-88F2-93B50ADA839C}" type="datetimeFigureOut">
               <a:rPr lang="en-US" smtClean="0"/>
-              <a:t>11/8/2025</a:t>
+              <a:t>11/17/2025</a:t>
             </a:fld>
             <a:endParaRPr lang="en-US"/>
           </a:p>
@@ -868,7 +867,7 @@
           <a:p>
             <a:fld id="{BC408777-D8E4-48B9-88F2-93B50ADA839C}" type="datetimeFigureOut">
               <a:rPr lang="en-US" smtClean="0"/>
-              <a:t>11/8/2025</a:t>
+              <a:t>11/17/2025</a:t>
             </a:fld>
             <a:endParaRPr lang="en-US"/>
           </a:p>
@@ -1143,7 +1142,7 @@
           <a:p>
             <a:fld id="{BC408777-D8E4-48B9-88F2-93B50ADA839C}" type="datetimeFigureOut">
               <a:rPr lang="en-US" smtClean="0"/>
-              <a:t>11/8/2025</a:t>
+              <a:t>11/17/2025</a:t>
             </a:fld>
             <a:endParaRPr lang="en-US"/>
           </a:p>
@@ -1408,7 +1407,7 @@
           <a:p>
             <a:fld id="{BC408777-D8E4-48B9-88F2-93B50ADA839C}" type="datetimeFigureOut">
               <a:rPr lang="en-US" smtClean="0"/>
-              <a:t>11/8/2025</a:t>
+              <a:t>11/17/2025</a:t>
             </a:fld>
             <a:endParaRPr lang="en-US"/>
           </a:p>
@@ -1820,7 +1819,7 @@
           <a:p>
             <a:fld id="{BC408777-D8E4-48B9-88F2-93B50ADA839C}" type="datetimeFigureOut">
               <a:rPr lang="en-US" smtClean="0"/>
-              <a:t>11/8/2025</a:t>
+              <a:t>11/17/2025</a:t>
             </a:fld>
             <a:endParaRPr lang="en-US"/>
           </a:p>
@@ -1961,7 +1960,7 @@
           <a:p>
             <a:fld id="{BC408777-D8E4-48B9-88F2-93B50ADA839C}" type="datetimeFigureOut">
               <a:rPr lang="en-US" smtClean="0"/>
-              <a:t>11/8/2025</a:t>
+              <a:t>11/17/2025</a:t>
             </a:fld>
             <a:endParaRPr lang="en-US"/>
           </a:p>
@@ -2074,7 +2073,7 @@
           <a:p>
             <a:fld id="{BC408777-D8E4-48B9-88F2-93B50ADA839C}" type="datetimeFigureOut">
               <a:rPr lang="en-US" smtClean="0"/>
-              <a:t>11/8/2025</a:t>
+              <a:t>11/17/2025</a:t>
             </a:fld>
             <a:endParaRPr lang="en-US"/>
           </a:p>
@@ -2385,7 +2384,7 @@
           <a:p>
             <a:fld id="{BC408777-D8E4-48B9-88F2-93B50ADA839C}" type="datetimeFigureOut">
               <a:rPr lang="en-US" smtClean="0"/>
-              <a:t>11/8/2025</a:t>
+              <a:t>11/17/2025</a:t>
             </a:fld>
             <a:endParaRPr lang="en-US"/>
           </a:p>
@@ -2673,7 +2672,7 @@
           <a:p>
             <a:fld id="{BC408777-D8E4-48B9-88F2-93B50ADA839C}" type="datetimeFigureOut">
               <a:rPr lang="en-US" smtClean="0"/>
-              <a:t>11/8/2025</a:t>
+              <a:t>11/17/2025</a:t>
             </a:fld>
             <a:endParaRPr lang="en-US"/>
           </a:p>
@@ -2914,7 +2913,7 @@
           <a:p>
             <a:fld id="{BC408777-D8E4-48B9-88F2-93B50ADA839C}" type="datetimeFigureOut">
               <a:rPr lang="en-US" smtClean="0"/>
-              <a:t>11/8/2025</a:t>
+              <a:t>11/17/2025</a:t>
             </a:fld>
             <a:endParaRPr lang="en-US"/>
           </a:p>
@@ -5844,114 +5843,6 @@
 </p:sld>
 </file>
 
-<file path=ppt/slides/slide6.xml><?xml version="1.0" encoding="utf-8"?>
-<p:sld xmlns:a="http://schemas.openxmlformats.org/drawingml/2006/main" xmlns:r="http://schemas.openxmlformats.org/officeDocument/2006/relationships" xmlns:p="http://schemas.openxmlformats.org/presentationml/2006/main">
-  <p:cSld>
-    <p:spTree>
-      <p:nvGrpSpPr>
-        <p:cNvPr id="1" name="">
-          <a:extLst>
-            <a:ext uri="{FF2B5EF4-FFF2-40B4-BE49-F238E27FC236}">
-              <a16:creationId xmlns:a16="http://schemas.microsoft.com/office/drawing/2014/main" id="{AB0AC64C-239F-5080-4E2B-93690D0B4D8E}"/>
-            </a:ext>
-          </a:extLst>
-        </p:cNvPr>
-        <p:cNvGrpSpPr/>
-        <p:nvPr/>
-      </p:nvGrpSpPr>
-      <p:grpSpPr>
-        <a:xfrm>
-          <a:off x="0" y="0"/>
-          <a:ext cx="0" cy="0"/>
-          <a:chOff x="0" y="0"/>
-          <a:chExt cx="0" cy="0"/>
-        </a:xfrm>
-      </p:grpSpPr>
-      <p:sp>
-        <p:nvSpPr>
-          <p:cNvPr id="2" name="Title 1">
-            <a:extLst>
-              <a:ext uri="{FF2B5EF4-FFF2-40B4-BE49-F238E27FC236}">
-                <a16:creationId xmlns:a16="http://schemas.microsoft.com/office/drawing/2014/main" id="{30760D1B-4CC4-E436-F21D-265995023B99}"/>
-              </a:ext>
-            </a:extLst>
-          </p:cNvPr>
-          <p:cNvSpPr>
-            <a:spLocks noGrp="1"/>
-          </p:cNvSpPr>
-          <p:nvPr>
-            <p:ph type="title"/>
-          </p:nvPr>
-        </p:nvSpPr>
-        <p:spPr>
-          <a:xfrm>
-            <a:off x="838200" y="365125"/>
-            <a:ext cx="10515600" cy="640080"/>
-          </a:xfrm>
-        </p:spPr>
-        <p:txBody>
-          <a:bodyPr>
-            <a:normAutofit/>
-          </a:bodyPr>
-          <a:lstStyle/>
-          <a:p>
-            <a:pPr algn="ctr"/>
-            <a:endParaRPr lang="en-US" sz="3600" dirty="0"/>
-          </a:p>
-        </p:txBody>
-      </p:sp>
-      <p:sp>
-        <p:nvSpPr>
-          <p:cNvPr id="3" name="Content Placeholder 2">
-            <a:extLst>
-              <a:ext uri="{FF2B5EF4-FFF2-40B4-BE49-F238E27FC236}">
-                <a16:creationId xmlns:a16="http://schemas.microsoft.com/office/drawing/2014/main" id="{1B658737-A1D4-416B-B301-D89402733D56}"/>
-              </a:ext>
-            </a:extLst>
-          </p:cNvPr>
-          <p:cNvSpPr>
-            <a:spLocks noGrp="1"/>
-          </p:cNvSpPr>
-          <p:nvPr>
-            <p:ph idx="1"/>
-          </p:nvPr>
-        </p:nvSpPr>
-        <p:spPr>
-          <a:xfrm>
-            <a:off x="838200" y="1091381"/>
-            <a:ext cx="10515600" cy="5085582"/>
-          </a:xfrm>
-        </p:spPr>
-        <p:txBody>
-          <a:bodyPr>
-            <a:normAutofit/>
-          </a:bodyPr>
-          <a:lstStyle/>
-          <a:p>
-            <a:pPr marL="0" indent="0">
-              <a:buNone/>
-            </a:pPr>
-            <a:endParaRPr lang="en-US" sz="2200" dirty="0">
-              <a:latin typeface="Open Sans" pitchFamily="2" charset="0"/>
-              <a:ea typeface="Open Sans" pitchFamily="2" charset="0"/>
-              <a:cs typeface="Open Sans" pitchFamily="2" charset="0"/>
-            </a:endParaRPr>
-          </a:p>
-        </p:txBody>
-      </p:sp>
-    </p:spTree>
-    <p:extLst>
-      <p:ext uri="{BB962C8B-B14F-4D97-AF65-F5344CB8AC3E}">
-        <p14:creationId xmlns:p14="http://schemas.microsoft.com/office/powerpoint/2010/main" val="210184614"/>
-      </p:ext>
-    </p:extLst>
-  </p:cSld>
-  <p:clrMapOvr>
-    <a:masterClrMapping/>
-  </p:clrMapOvr>
-</p:sld>
-</file>
-
 <file path=ppt/theme/theme1.xml><?xml version="1.0" encoding="utf-8"?>
 <a:theme xmlns:a="http://schemas.openxmlformats.org/drawingml/2006/main" name="Office Theme">
   <a:themeElements>

</xml_diff>